<commit_message>
Update Slide and Readme
</commit_message>
<xml_diff>
--- a/heart_project_slides.pptx
+++ b/heart_project_slides.pptx
@@ -15,17 +15,16 @@
     <p:sldId id="263" r:id="rId9"/>
     <p:sldId id="281" r:id="rId10"/>
     <p:sldId id="278" r:id="rId11"/>
-    <p:sldId id="280" r:id="rId12"/>
-    <p:sldId id="276" r:id="rId13"/>
-    <p:sldId id="282" r:id="rId14"/>
-    <p:sldId id="268" r:id="rId15"/>
+    <p:sldId id="282" r:id="rId12"/>
+    <p:sldId id="280" r:id="rId13"/>
+    <p:sldId id="268" r:id="rId14"/>
+    <p:sldId id="276" r:id="rId15"/>
     <p:sldId id="277" r:id="rId16"/>
     <p:sldId id="279" r:id="rId17"/>
     <p:sldId id="275" r:id="rId18"/>
     <p:sldId id="267" r:id="rId19"/>
-    <p:sldId id="264" r:id="rId20"/>
-    <p:sldId id="265" r:id="rId21"/>
-    <p:sldId id="266" r:id="rId22"/>
+    <p:sldId id="265" r:id="rId20"/>
+    <p:sldId id="266" r:id="rId21"/>
   </p:sldIdLst>
   <p:sldSz cx="12192000" cy="6858000"/>
   <p:notesSz cx="6858000" cy="9144000"/>
@@ -7001,45 +7000,12 @@
           <a:chExt cx="0" cy="0"/>
         </a:xfrm>
       </p:grpSpPr>
-      <p:sp>
-        <p:nvSpPr>
-          <p:cNvPr id="5" name="Title 1">
+      <p:pic>
+        <p:nvPicPr>
+          <p:cNvPr id="6" name="Picture 5" descr="A screenshot of a social media post&#10;&#10;Description automatically generated">
             <a:extLst>
               <a:ext uri="{FF2B5EF4-FFF2-40B4-BE49-F238E27FC236}">
-                <a16:creationId xmlns:a16="http://schemas.microsoft.com/office/drawing/2014/main" id="{7D38568D-BFDC-9C47-AC7C-0E02D73ED427}"/>
-              </a:ext>
-            </a:extLst>
-          </p:cNvPr>
-          <p:cNvSpPr>
-            <a:spLocks noGrp="1"/>
-          </p:cNvSpPr>
-          <p:nvPr>
-            <p:ph type="title"/>
-          </p:nvPr>
-        </p:nvSpPr>
-        <p:spPr>
-          <a:xfrm>
-            <a:off x="2895600" y="764373"/>
-            <a:ext cx="8610600" cy="1293028"/>
-          </a:xfrm>
-        </p:spPr>
-        <p:txBody>
-          <a:bodyPr/>
-          <a:lstStyle/>
-          <a:p>
-            <a:r>
-              <a:rPr lang="en-US" dirty="0"/>
-              <a:t>Interesting figures</a:t>
-            </a:r>
-          </a:p>
-        </p:txBody>
-      </p:sp>
-      <p:pic>
-        <p:nvPicPr>
-          <p:cNvPr id="3" name="Picture 2" descr="A screenshot of a cell phone&#10;&#10;Description automatically generated">
-            <a:extLst>
-              <a:ext uri="{FF2B5EF4-FFF2-40B4-BE49-F238E27FC236}">
-                <a16:creationId xmlns:a16="http://schemas.microsoft.com/office/drawing/2014/main" id="{F17DC332-85E6-CD43-A2A2-D3EC08CCBEEC}"/>
+                <a16:creationId xmlns:a16="http://schemas.microsoft.com/office/drawing/2014/main" id="{64962287-C67B-D147-B23A-C3D4A4093FF9}"/>
               </a:ext>
             </a:extLst>
           </p:cNvPr>
@@ -7056,18 +7022,133 @@
         </p:blipFill>
         <p:spPr>
           <a:xfrm>
-            <a:off x="1524000" y="1958009"/>
-            <a:ext cx="9144000" cy="4572000"/>
+            <a:off x="430696" y="2273688"/>
+            <a:ext cx="7719391" cy="3859696"/>
           </a:xfrm>
           <a:prstGeom prst="rect">
             <a:avLst/>
           </a:prstGeom>
         </p:spPr>
       </p:pic>
+      <p:sp>
+        <p:nvSpPr>
+          <p:cNvPr id="5" name="Title 1">
+            <a:extLst>
+              <a:ext uri="{FF2B5EF4-FFF2-40B4-BE49-F238E27FC236}">
+                <a16:creationId xmlns:a16="http://schemas.microsoft.com/office/drawing/2014/main" id="{7D38568D-BFDC-9C47-AC7C-0E02D73ED427}"/>
+              </a:ext>
+            </a:extLst>
+          </p:cNvPr>
+          <p:cNvSpPr>
+            <a:spLocks noGrp="1"/>
+          </p:cNvSpPr>
+          <p:nvPr>
+            <p:ph type="title"/>
+          </p:nvPr>
+        </p:nvSpPr>
+        <p:spPr>
+          <a:xfrm>
+            <a:off x="2895600" y="764373"/>
+            <a:ext cx="8610600" cy="1293028"/>
+          </a:xfrm>
+        </p:spPr>
+        <p:txBody>
+          <a:bodyPr/>
+          <a:lstStyle/>
+          <a:p>
+            <a:r>
+              <a:rPr lang="en-US" dirty="0"/>
+              <a:t>Interesting figures</a:t>
+            </a:r>
+          </a:p>
+        </p:txBody>
+      </p:sp>
+      <p:pic>
+        <p:nvPicPr>
+          <p:cNvPr id="7" name="Picture 6" descr="A screenshot of a cell phone&#10;&#10;Description automatically generated">
+            <a:extLst>
+              <a:ext uri="{FF2B5EF4-FFF2-40B4-BE49-F238E27FC236}">
+                <a16:creationId xmlns:a16="http://schemas.microsoft.com/office/drawing/2014/main" id="{9F0F03DD-32FA-D248-B44F-4D08B3F12854}"/>
+              </a:ext>
+            </a:extLst>
+          </p:cNvPr>
+          <p:cNvPicPr>
+            <a:picLocks noChangeAspect="1"/>
+          </p:cNvPicPr>
+          <p:nvPr/>
+        </p:nvPicPr>
+        <p:blipFill>
+          <a:blip r:embed="rId3"/>
+          <a:stretch>
+            <a:fillRect/>
+          </a:stretch>
+        </p:blipFill>
+        <p:spPr>
+          <a:xfrm>
+            <a:off x="8857470" y="2273688"/>
+            <a:ext cx="2536086" cy="2059609"/>
+          </a:xfrm>
+          <a:prstGeom prst="rect">
+            <a:avLst/>
+          </a:prstGeom>
+        </p:spPr>
+      </p:pic>
+      <p:sp>
+        <p:nvSpPr>
+          <p:cNvPr id="8" name="TextBox 7">
+            <a:extLst>
+              <a:ext uri="{FF2B5EF4-FFF2-40B4-BE49-F238E27FC236}">
+                <a16:creationId xmlns:a16="http://schemas.microsoft.com/office/drawing/2014/main" id="{6C900505-4661-7F4C-8FB5-4936BA8B93B1}"/>
+              </a:ext>
+            </a:extLst>
+          </p:cNvPr>
+          <p:cNvSpPr txBox="1"/>
+          <p:nvPr/>
+        </p:nvSpPr>
+        <p:spPr>
+          <a:xfrm>
+            <a:off x="8669431" y="4656056"/>
+            <a:ext cx="2912164" cy="1477328"/>
+          </a:xfrm>
+          <a:prstGeom prst="rect">
+            <a:avLst/>
+          </a:prstGeom>
+          <a:noFill/>
+        </p:spPr>
+        <p:txBody>
+          <a:bodyPr wrap="square" rtlCol="0">
+            <a:spAutoFit/>
+          </a:bodyPr>
+          <a:lstStyle/>
+          <a:p>
+            <a:pPr marL="285750" indent="-285750">
+              <a:buFont typeface="Arial" panose="020B0604020202020204" pitchFamily="34" charset="0"/>
+              <a:buChar char="•"/>
+            </a:pPr>
+            <a:r>
+              <a:rPr lang="en-US" dirty="0"/>
+              <a:t>55.7% of males have heart disease</a:t>
+            </a:r>
+          </a:p>
+          <a:p>
+            <a:pPr marL="285750" indent="-285750">
+              <a:buFont typeface="Arial" panose="020B0604020202020204" pitchFamily="34" charset="0"/>
+              <a:buChar char="•"/>
+            </a:pPr>
+            <a:r>
+              <a:rPr lang="en-US" dirty="0"/>
+              <a:t>25.3% of females have heart disease</a:t>
+            </a:r>
+          </a:p>
+          <a:p>
+            <a:endParaRPr lang="en-US" dirty="0"/>
+          </a:p>
+        </p:txBody>
+      </p:sp>
     </p:spTree>
     <p:extLst>
       <p:ext uri="{BB962C8B-B14F-4D97-AF65-F5344CB8AC3E}">
-        <p14:creationId xmlns:p14="http://schemas.microsoft.com/office/powerpoint/2010/main" val="298907630"/>
+        <p14:creationId xmlns:p14="http://schemas.microsoft.com/office/powerpoint/2010/main" val="2294226940"/>
       </p:ext>
     </p:extLst>
   </p:cSld>
@@ -7132,7 +7213,7 @@
           <p:cNvPr id="3" name="Picture 2" descr="A screenshot of a cell phone&#10;&#10;Description automatically generated">
             <a:extLst>
               <a:ext uri="{FF2B5EF4-FFF2-40B4-BE49-F238E27FC236}">
-                <a16:creationId xmlns:a16="http://schemas.microsoft.com/office/drawing/2014/main" id="{4F93DC73-9D65-7E4D-BA30-3C3904AA5FA3}"/>
+                <a16:creationId xmlns:a16="http://schemas.microsoft.com/office/drawing/2014/main" id="{F17DC332-85E6-CD43-A2A2-D3EC08CCBEEC}"/>
               </a:ext>
             </a:extLst>
           </p:cNvPr>
@@ -7149,7 +7230,7 @@
         </p:blipFill>
         <p:spPr>
           <a:xfrm>
-            <a:off x="1524000" y="2057401"/>
+            <a:off x="1524000" y="1958009"/>
             <a:ext cx="9144000" cy="4572000"/>
           </a:xfrm>
           <a:prstGeom prst="rect">
@@ -7160,7 +7241,7 @@
     </p:spTree>
     <p:extLst>
       <p:ext uri="{BB962C8B-B14F-4D97-AF65-F5344CB8AC3E}">
-        <p14:creationId xmlns:p14="http://schemas.microsoft.com/office/powerpoint/2010/main" val="3960276496"/>
+        <p14:creationId xmlns:p14="http://schemas.microsoft.com/office/powerpoint/2010/main" val="298907630"/>
       </p:ext>
     </p:extLst>
   </p:cSld>
@@ -7187,12 +7268,45 @@
           <a:chExt cx="0" cy="0"/>
         </a:xfrm>
       </p:grpSpPr>
+      <p:sp>
+        <p:nvSpPr>
+          <p:cNvPr id="5" name="Title 1">
+            <a:extLst>
+              <a:ext uri="{FF2B5EF4-FFF2-40B4-BE49-F238E27FC236}">
+                <a16:creationId xmlns:a16="http://schemas.microsoft.com/office/drawing/2014/main" id="{7D38568D-BFDC-9C47-AC7C-0E02D73ED427}"/>
+              </a:ext>
+            </a:extLst>
+          </p:cNvPr>
+          <p:cNvSpPr>
+            <a:spLocks noGrp="1"/>
+          </p:cNvSpPr>
+          <p:nvPr>
+            <p:ph type="title"/>
+          </p:nvPr>
+        </p:nvSpPr>
+        <p:spPr>
+          <a:xfrm>
+            <a:off x="2895600" y="764373"/>
+            <a:ext cx="8610600" cy="1293028"/>
+          </a:xfrm>
+        </p:spPr>
+        <p:txBody>
+          <a:bodyPr/>
+          <a:lstStyle/>
+          <a:p>
+            <a:r>
+              <a:rPr lang="en-US" dirty="0"/>
+              <a:t>Interesting figures</a:t>
+            </a:r>
+          </a:p>
+        </p:txBody>
+      </p:sp>
       <p:pic>
         <p:nvPicPr>
-          <p:cNvPr id="6" name="Picture 5" descr="A screenshot of a social media post&#10;&#10;Description automatically generated">
+          <p:cNvPr id="7" name="Picture 6" descr="A screenshot of a cell phone&#10;&#10;Description automatically generated">
             <a:extLst>
               <a:ext uri="{FF2B5EF4-FFF2-40B4-BE49-F238E27FC236}">
-                <a16:creationId xmlns:a16="http://schemas.microsoft.com/office/drawing/2014/main" id="{64962287-C67B-D147-B23A-C3D4A4093FF9}"/>
+                <a16:creationId xmlns:a16="http://schemas.microsoft.com/office/drawing/2014/main" id="{8286A32D-628F-E04B-B483-45AD98E01E64}"/>
               </a:ext>
             </a:extLst>
           </p:cNvPr>
@@ -7209,133 +7323,18 @@
         </p:blipFill>
         <p:spPr>
           <a:xfrm>
-            <a:off x="430696" y="2273688"/>
-            <a:ext cx="7719391" cy="3859696"/>
+            <a:off x="1524000" y="1955374"/>
+            <a:ext cx="9144000" cy="4572000"/>
           </a:xfrm>
           <a:prstGeom prst="rect">
             <a:avLst/>
           </a:prstGeom>
         </p:spPr>
       </p:pic>
-      <p:sp>
-        <p:nvSpPr>
-          <p:cNvPr id="5" name="Title 1">
-            <a:extLst>
-              <a:ext uri="{FF2B5EF4-FFF2-40B4-BE49-F238E27FC236}">
-                <a16:creationId xmlns:a16="http://schemas.microsoft.com/office/drawing/2014/main" id="{7D38568D-BFDC-9C47-AC7C-0E02D73ED427}"/>
-              </a:ext>
-            </a:extLst>
-          </p:cNvPr>
-          <p:cNvSpPr>
-            <a:spLocks noGrp="1"/>
-          </p:cNvSpPr>
-          <p:nvPr>
-            <p:ph type="title"/>
-          </p:nvPr>
-        </p:nvSpPr>
-        <p:spPr>
-          <a:xfrm>
-            <a:off x="2895600" y="764373"/>
-            <a:ext cx="8610600" cy="1293028"/>
-          </a:xfrm>
-        </p:spPr>
-        <p:txBody>
-          <a:bodyPr/>
-          <a:lstStyle/>
-          <a:p>
-            <a:r>
-              <a:rPr lang="en-US" dirty="0"/>
-              <a:t>Interesting figures</a:t>
-            </a:r>
-          </a:p>
-        </p:txBody>
-      </p:sp>
-      <p:pic>
-        <p:nvPicPr>
-          <p:cNvPr id="7" name="Picture 6" descr="A screenshot of a cell phone&#10;&#10;Description automatically generated">
-            <a:extLst>
-              <a:ext uri="{FF2B5EF4-FFF2-40B4-BE49-F238E27FC236}">
-                <a16:creationId xmlns:a16="http://schemas.microsoft.com/office/drawing/2014/main" id="{9F0F03DD-32FA-D248-B44F-4D08B3F12854}"/>
-              </a:ext>
-            </a:extLst>
-          </p:cNvPr>
-          <p:cNvPicPr>
-            <a:picLocks noChangeAspect="1"/>
-          </p:cNvPicPr>
-          <p:nvPr/>
-        </p:nvPicPr>
-        <p:blipFill>
-          <a:blip r:embed="rId3"/>
-          <a:stretch>
-            <a:fillRect/>
-          </a:stretch>
-        </p:blipFill>
-        <p:spPr>
-          <a:xfrm>
-            <a:off x="8857470" y="2273688"/>
-            <a:ext cx="2536086" cy="2059609"/>
-          </a:xfrm>
-          <a:prstGeom prst="rect">
-            <a:avLst/>
-          </a:prstGeom>
-        </p:spPr>
-      </p:pic>
-      <p:sp>
-        <p:nvSpPr>
-          <p:cNvPr id="8" name="TextBox 7">
-            <a:extLst>
-              <a:ext uri="{FF2B5EF4-FFF2-40B4-BE49-F238E27FC236}">
-                <a16:creationId xmlns:a16="http://schemas.microsoft.com/office/drawing/2014/main" id="{6C900505-4661-7F4C-8FB5-4936BA8B93B1}"/>
-              </a:ext>
-            </a:extLst>
-          </p:cNvPr>
-          <p:cNvSpPr txBox="1"/>
-          <p:nvPr/>
-        </p:nvSpPr>
-        <p:spPr>
-          <a:xfrm>
-            <a:off x="8669431" y="4656056"/>
-            <a:ext cx="2912164" cy="1477328"/>
-          </a:xfrm>
-          <a:prstGeom prst="rect">
-            <a:avLst/>
-          </a:prstGeom>
-          <a:noFill/>
-        </p:spPr>
-        <p:txBody>
-          <a:bodyPr wrap="square" rtlCol="0">
-            <a:spAutoFit/>
-          </a:bodyPr>
-          <a:lstStyle/>
-          <a:p>
-            <a:pPr marL="285750" indent="-285750">
-              <a:buFont typeface="Arial" panose="020B0604020202020204" pitchFamily="34" charset="0"/>
-              <a:buChar char="•"/>
-            </a:pPr>
-            <a:r>
-              <a:rPr lang="en-US" dirty="0"/>
-              <a:t>55.7% of males have heart disease</a:t>
-            </a:r>
-          </a:p>
-          <a:p>
-            <a:pPr marL="285750" indent="-285750">
-              <a:buFont typeface="Arial" panose="020B0604020202020204" pitchFamily="34" charset="0"/>
-              <a:buChar char="•"/>
-            </a:pPr>
-            <a:r>
-              <a:rPr lang="en-US" dirty="0"/>
-              <a:t>25.3% of females have heart disease</a:t>
-            </a:r>
-          </a:p>
-          <a:p>
-            <a:endParaRPr lang="en-US" dirty="0"/>
-          </a:p>
-        </p:txBody>
-      </p:sp>
     </p:spTree>
     <p:extLst>
       <p:ext uri="{BB962C8B-B14F-4D97-AF65-F5344CB8AC3E}">
-        <p14:creationId xmlns:p14="http://schemas.microsoft.com/office/powerpoint/2010/main" val="2294226940"/>
+        <p14:creationId xmlns:p14="http://schemas.microsoft.com/office/powerpoint/2010/main" val="605040012"/>
       </p:ext>
     </p:extLst>
   </p:cSld>
@@ -7397,10 +7396,10 @@
       </p:sp>
       <p:pic>
         <p:nvPicPr>
-          <p:cNvPr id="7" name="Picture 6" descr="A screenshot of a cell phone&#10;&#10;Description automatically generated">
+          <p:cNvPr id="3" name="Picture 2" descr="A screenshot of a cell phone&#10;&#10;Description automatically generated">
             <a:extLst>
               <a:ext uri="{FF2B5EF4-FFF2-40B4-BE49-F238E27FC236}">
-                <a16:creationId xmlns:a16="http://schemas.microsoft.com/office/drawing/2014/main" id="{8286A32D-628F-E04B-B483-45AD98E01E64}"/>
+                <a16:creationId xmlns:a16="http://schemas.microsoft.com/office/drawing/2014/main" id="{4F93DC73-9D65-7E4D-BA30-3C3904AA5FA3}"/>
               </a:ext>
             </a:extLst>
           </p:cNvPr>
@@ -7417,7 +7416,7 @@
         </p:blipFill>
         <p:spPr>
           <a:xfrm>
-            <a:off x="1524000" y="1955374"/>
+            <a:off x="1524000" y="2057401"/>
             <a:ext cx="9144000" cy="4572000"/>
           </a:xfrm>
           <a:prstGeom prst="rect">
@@ -7428,7 +7427,7 @@
     </p:spTree>
     <p:extLst>
       <p:ext uri="{BB962C8B-B14F-4D97-AF65-F5344CB8AC3E}">
-        <p14:creationId xmlns:p14="http://schemas.microsoft.com/office/powerpoint/2010/main" val="605040012"/>
+        <p14:creationId xmlns:p14="http://schemas.microsoft.com/office/powerpoint/2010/main" val="3960276496"/>
       </p:ext>
     </p:extLst>
   </p:cSld>
@@ -7716,7 +7715,7 @@
         </p:nvSpPr>
         <p:spPr>
           <a:xfrm>
-            <a:off x="2895600" y="117859"/>
+            <a:off x="1790698" y="453256"/>
             <a:ext cx="8610600" cy="1293028"/>
           </a:xfrm>
         </p:spPr>
@@ -7724,9 +7723,10 @@
           <a:bodyPr/>
           <a:lstStyle/>
           <a:p>
+            <a:pPr algn="ctr"/>
             <a:r>
               <a:rPr lang="en-US" dirty="0"/>
-              <a:t>Interesting figures</a:t>
+              <a:t>Cholesterol t-test</a:t>
             </a:r>
           </a:p>
         </p:txBody>
@@ -7791,6 +7791,41 @@
           </a:prstGeom>
         </p:spPr>
       </p:pic>
+      <p:sp>
+        <p:nvSpPr>
+          <p:cNvPr id="2" name="TextBox 1">
+            <a:extLst>
+              <a:ext uri="{FF2B5EF4-FFF2-40B4-BE49-F238E27FC236}">
+                <a16:creationId xmlns:a16="http://schemas.microsoft.com/office/drawing/2014/main" id="{655FB972-7603-4A6F-AFFE-703FD0E52E7E}"/>
+              </a:ext>
+            </a:extLst>
+          </p:cNvPr>
+          <p:cNvSpPr txBox="1"/>
+          <p:nvPr/>
+        </p:nvSpPr>
+        <p:spPr>
+          <a:xfrm>
+            <a:off x="7300289" y="6424300"/>
+            <a:ext cx="3101009" cy="369332"/>
+          </a:xfrm>
+          <a:prstGeom prst="rect">
+            <a:avLst/>
+          </a:prstGeom>
+          <a:noFill/>
+        </p:spPr>
+        <p:txBody>
+          <a:bodyPr wrap="square" rtlCol="0">
+            <a:spAutoFit/>
+          </a:bodyPr>
+          <a:lstStyle/>
+          <a:p>
+            <a:r>
+              <a:rPr lang="en-US" dirty="0"/>
+              <a:t>Confidence Level : 95%</a:t>
+            </a:r>
+          </a:p>
+        </p:txBody>
+      </p:sp>
     </p:spTree>
     <p:extLst>
       <p:ext uri="{BB962C8B-B14F-4D97-AF65-F5344CB8AC3E}">
@@ -7975,354 +8010,6 @@
           <a:p>
             <a:r>
               <a:rPr lang="en-US" dirty="0"/>
-              <a:t>Data Analysis</a:t>
-            </a:r>
-          </a:p>
-        </p:txBody>
-      </p:sp>
-      <p:sp>
-        <p:nvSpPr>
-          <p:cNvPr id="3" name="Content Placeholder 2">
-            <a:extLst>
-              <a:ext uri="{FF2B5EF4-FFF2-40B4-BE49-F238E27FC236}">
-                <a16:creationId xmlns:a16="http://schemas.microsoft.com/office/drawing/2014/main" id="{84D4223E-4745-8748-8813-8294A7927AF9}"/>
-              </a:ext>
-            </a:extLst>
-          </p:cNvPr>
-          <p:cNvSpPr>
-            <a:spLocks noGrp="1"/>
-          </p:cNvSpPr>
-          <p:nvPr>
-            <p:ph idx="1"/>
-          </p:nvPr>
-        </p:nvSpPr>
-        <p:spPr/>
-        <p:txBody>
-          <a:bodyPr>
-            <a:normAutofit/>
-          </a:bodyPr>
-          <a:lstStyle/>
-          <a:p>
-            <a:pPr marL="0" indent="0">
-              <a:buNone/>
-            </a:pPr>
-            <a:r>
-              <a:rPr lang="en-US" b="1" dirty="0"/>
-              <a:t>Analysis Steps</a:t>
-            </a:r>
-          </a:p>
-          <a:p>
-            <a:pPr marL="457200" indent="-457200">
-              <a:buFont typeface="+mj-lt"/>
-              <a:buAutoNum type="arabicPeriod"/>
-            </a:pPr>
-            <a:r>
-              <a:rPr lang="en-US" dirty="0"/>
-              <a:t>Clean DataFrame</a:t>
-            </a:r>
-          </a:p>
-          <a:p>
-            <a:pPr marL="914400" lvl="1" indent="-457200">
-              <a:buFont typeface="+mj-lt"/>
-              <a:buAutoNum type="arabicPeriod"/>
-            </a:pPr>
-            <a:r>
-              <a:rPr lang="en-US" dirty="0"/>
-              <a:t>Remove </a:t>
-            </a:r>
-            <a:r>
-              <a:rPr lang="en-US" dirty="0" err="1"/>
-              <a:t>NaNs</a:t>
-            </a:r>
-            <a:endParaRPr lang="en-US" dirty="0"/>
-          </a:p>
-          <a:p>
-            <a:pPr marL="914400" lvl="1" indent="-457200">
-              <a:buFont typeface="+mj-lt"/>
-              <a:buAutoNum type="arabicPeriod"/>
-            </a:pPr>
-            <a:r>
-              <a:rPr lang="en-US" dirty="0"/>
-              <a:t>Rename Columns</a:t>
-            </a:r>
-          </a:p>
-          <a:p>
-            <a:pPr marL="457200" indent="-457200">
-              <a:buFont typeface="+mj-lt"/>
-              <a:buAutoNum type="arabicPeriod"/>
-            </a:pPr>
-            <a:r>
-              <a:rPr lang="en-US" dirty="0"/>
-              <a:t>Separate necessary variables</a:t>
-            </a:r>
-          </a:p>
-          <a:p>
-            <a:pPr marL="457200" indent="-457200">
-              <a:buFont typeface="+mj-lt"/>
-              <a:buAutoNum type="arabicPeriod"/>
-            </a:pPr>
-            <a:r>
-              <a:rPr lang="en-US" dirty="0"/>
-              <a:t>Plot variables</a:t>
-            </a:r>
-          </a:p>
-          <a:p>
-            <a:pPr marL="457200" indent="-457200">
-              <a:buFont typeface="+mj-lt"/>
-              <a:buAutoNum type="arabicPeriod"/>
-            </a:pPr>
-            <a:r>
-              <a:rPr lang="en-US" dirty="0"/>
-              <a:t>Analyze</a:t>
-            </a:r>
-          </a:p>
-          <a:p>
-            <a:pPr marL="457200" indent="-457200">
-              <a:buFont typeface="+mj-lt"/>
-              <a:buAutoNum type="arabicPeriod"/>
-            </a:pPr>
-            <a:r>
-              <a:rPr lang="en-US" dirty="0"/>
-              <a:t>Format plot</a:t>
-            </a:r>
-          </a:p>
-        </p:txBody>
-      </p:sp>
-    </p:spTree>
-    <p:extLst>
-      <p:ext uri="{BB962C8B-B14F-4D97-AF65-F5344CB8AC3E}">
-        <p14:creationId xmlns:p14="http://schemas.microsoft.com/office/powerpoint/2010/main" val="2850439078"/>
-      </p:ext>
-    </p:extLst>
-  </p:cSld>
-  <p:clrMapOvr>
-    <a:masterClrMapping/>
-  </p:clrMapOvr>
-</p:sld>
-</file>
-
-<file path=ppt/slides/slide2.xml><?xml version="1.0" encoding="utf-8"?>
-<p:sld xmlns:a="http://schemas.openxmlformats.org/drawingml/2006/main" xmlns:r="http://schemas.openxmlformats.org/officeDocument/2006/relationships" xmlns:p="http://schemas.openxmlformats.org/presentationml/2006/main">
-  <p:cSld>
-    <p:spTree>
-      <p:nvGrpSpPr>
-        <p:cNvPr id="1" name=""/>
-        <p:cNvGrpSpPr/>
-        <p:nvPr/>
-      </p:nvGrpSpPr>
-      <p:grpSpPr>
-        <a:xfrm>
-          <a:off x="0" y="0"/>
-          <a:ext cx="0" cy="0"/>
-          <a:chOff x="0" y="0"/>
-          <a:chExt cx="0" cy="0"/>
-        </a:xfrm>
-      </p:grpSpPr>
-      <p:sp>
-        <p:nvSpPr>
-          <p:cNvPr id="2" name="Title 1">
-            <a:extLst>
-              <a:ext uri="{FF2B5EF4-FFF2-40B4-BE49-F238E27FC236}">
-                <a16:creationId xmlns:a16="http://schemas.microsoft.com/office/drawing/2014/main" id="{440D8973-AE11-0D48-ABBE-0DA2F02F2D15}"/>
-              </a:ext>
-            </a:extLst>
-          </p:cNvPr>
-          <p:cNvSpPr>
-            <a:spLocks noGrp="1"/>
-          </p:cNvSpPr>
-          <p:nvPr>
-            <p:ph type="title"/>
-          </p:nvPr>
-        </p:nvSpPr>
-        <p:spPr/>
-        <p:txBody>
-          <a:bodyPr/>
-          <a:lstStyle/>
-          <a:p>
-            <a:r>
-              <a:rPr lang="en-US" dirty="0"/>
-              <a:t>Motivation</a:t>
-            </a:r>
-          </a:p>
-        </p:txBody>
-      </p:sp>
-      <p:sp>
-        <p:nvSpPr>
-          <p:cNvPr id="3" name="Content Placeholder 2">
-            <a:extLst>
-              <a:ext uri="{FF2B5EF4-FFF2-40B4-BE49-F238E27FC236}">
-                <a16:creationId xmlns:a16="http://schemas.microsoft.com/office/drawing/2014/main" id="{84D4223E-4745-8748-8813-8294A7927AF9}"/>
-              </a:ext>
-            </a:extLst>
-          </p:cNvPr>
-          <p:cNvSpPr>
-            <a:spLocks noGrp="1"/>
-          </p:cNvSpPr>
-          <p:nvPr>
-            <p:ph idx="1"/>
-          </p:nvPr>
-        </p:nvSpPr>
-        <p:spPr/>
-        <p:txBody>
-          <a:bodyPr>
-            <a:normAutofit/>
-          </a:bodyPr>
-          <a:lstStyle/>
-          <a:p>
-            <a:r>
-              <a:rPr lang="en-US" dirty="0"/>
-              <a:t>The Lipid Heart Hypothesis (1950s)</a:t>
-            </a:r>
-          </a:p>
-          <a:p>
-            <a:pPr lvl="1"/>
-            <a:r>
-              <a:rPr lang="en-US" dirty="0"/>
-              <a:t>Cholesterol and Saturated Fat = </a:t>
-            </a:r>
-            <a:r>
-              <a:rPr lang="en-US" dirty="0">
-                <a:solidFill>
-                  <a:srgbClr val="FF0000"/>
-                </a:solidFill>
-              </a:rPr>
-              <a:t>Heart Disease</a:t>
-            </a:r>
-            <a:endParaRPr lang="en-US" dirty="0"/>
-          </a:p>
-          <a:p>
-            <a:pPr lvl="1"/>
-            <a:r>
-              <a:rPr lang="en-US" dirty="0"/>
-              <a:t>Recent studies point to </a:t>
-            </a:r>
-            <a:r>
-              <a:rPr lang="en-US" dirty="0">
-                <a:solidFill>
-                  <a:srgbClr val="FF0000"/>
-                </a:solidFill>
-              </a:rPr>
-              <a:t>sugar and processed carbs</a:t>
-            </a:r>
-          </a:p>
-          <a:p>
-            <a:r>
-              <a:rPr lang="en-US" dirty="0"/>
-              <a:t>What is the relationship between the </a:t>
-            </a:r>
-            <a:r>
-              <a:rPr lang="en-US" u="sng" dirty="0"/>
-              <a:t>presence of heart disease</a:t>
-            </a:r>
-            <a:r>
-              <a:rPr lang="en-US" dirty="0"/>
-              <a:t> and:</a:t>
-            </a:r>
-          </a:p>
-          <a:p>
-            <a:pPr lvl="1"/>
-            <a:r>
-              <a:rPr lang="en-US" dirty="0"/>
-              <a:t>Cholesterol?</a:t>
-            </a:r>
-          </a:p>
-          <a:p>
-            <a:pPr lvl="1"/>
-            <a:r>
-              <a:rPr lang="en-US" dirty="0"/>
-              <a:t>Fasting Blood Sugar?</a:t>
-            </a:r>
-          </a:p>
-          <a:p>
-            <a:pPr lvl="1"/>
-            <a:r>
-              <a:rPr lang="en-US" dirty="0"/>
-              <a:t>Resting Blood Pressure?</a:t>
-            </a:r>
-          </a:p>
-          <a:p>
-            <a:pPr lvl="1"/>
-            <a:r>
-              <a:rPr lang="en-US" dirty="0"/>
-              <a:t>Age? Sex?</a:t>
-            </a:r>
-          </a:p>
-          <a:p>
-            <a:pPr lvl="1"/>
-            <a:r>
-              <a:rPr lang="en-US" dirty="0"/>
-              <a:t>Type of Chest Pain?</a:t>
-            </a:r>
-          </a:p>
-          <a:p>
-            <a:pPr lvl="1"/>
-            <a:r>
-              <a:rPr lang="en-US" dirty="0"/>
-              <a:t>Maximum Heart Rate?</a:t>
-            </a:r>
-          </a:p>
-          <a:p>
-            <a:pPr lvl="1"/>
-            <a:endParaRPr lang="en-US" dirty="0"/>
-          </a:p>
-          <a:p>
-            <a:endParaRPr lang="en-US" dirty="0"/>
-          </a:p>
-        </p:txBody>
-      </p:sp>
-    </p:spTree>
-    <p:extLst>
-      <p:ext uri="{BB962C8B-B14F-4D97-AF65-F5344CB8AC3E}">
-        <p14:creationId xmlns:p14="http://schemas.microsoft.com/office/powerpoint/2010/main" val="650287038"/>
-      </p:ext>
-    </p:extLst>
-  </p:cSld>
-  <p:clrMapOvr>
-    <a:masterClrMapping/>
-  </p:clrMapOvr>
-</p:sld>
-</file>
-
-<file path=ppt/slides/slide20.xml><?xml version="1.0" encoding="utf-8"?>
-<p:sld xmlns:a="http://schemas.openxmlformats.org/drawingml/2006/main" xmlns:r="http://schemas.openxmlformats.org/officeDocument/2006/relationships" xmlns:p="http://schemas.openxmlformats.org/presentationml/2006/main">
-  <p:cSld>
-    <p:spTree>
-      <p:nvGrpSpPr>
-        <p:cNvPr id="1" name=""/>
-        <p:cNvGrpSpPr/>
-        <p:nvPr/>
-      </p:nvGrpSpPr>
-      <p:grpSpPr>
-        <a:xfrm>
-          <a:off x="0" y="0"/>
-          <a:ext cx="0" cy="0"/>
-          <a:chOff x="0" y="0"/>
-          <a:chExt cx="0" cy="0"/>
-        </a:xfrm>
-      </p:grpSpPr>
-      <p:sp>
-        <p:nvSpPr>
-          <p:cNvPr id="2" name="Title 1">
-            <a:extLst>
-              <a:ext uri="{FF2B5EF4-FFF2-40B4-BE49-F238E27FC236}">
-                <a16:creationId xmlns:a16="http://schemas.microsoft.com/office/drawing/2014/main" id="{440D8973-AE11-0D48-ABBE-0DA2F02F2D15}"/>
-              </a:ext>
-            </a:extLst>
-          </p:cNvPr>
-          <p:cNvSpPr>
-            <a:spLocks noGrp="1"/>
-          </p:cNvSpPr>
-          <p:nvPr>
-            <p:ph type="title"/>
-          </p:nvPr>
-        </p:nvSpPr>
-        <p:spPr/>
-        <p:txBody>
-          <a:bodyPr/>
-          <a:lstStyle/>
-          <a:p>
-            <a:r>
-              <a:rPr lang="en-US" dirty="0"/>
               <a:t>Discussion</a:t>
             </a:r>
           </a:p>
@@ -8343,14 +8030,14 @@
           <p:nvPr>
             <p:extLst>
               <p:ext uri="{D42A27DB-BD31-4B8C-83A1-F6EECF244321}">
-                <p14:modId xmlns:p14="http://schemas.microsoft.com/office/powerpoint/2010/main" val="176172329"/>
+                <p14:modId xmlns:p14="http://schemas.microsoft.com/office/powerpoint/2010/main" val="4192017530"/>
               </p:ext>
             </p:extLst>
           </p:nvPr>
         </p:nvGraphicFramePr>
         <p:xfrm>
           <a:off x="685799" y="2358482"/>
-          <a:ext cx="10498874" cy="3782073"/>
+          <a:ext cx="10498874" cy="3538233"/>
         </p:xfrm>
         <a:graphic>
           <a:graphicData uri="http://schemas.openxmlformats.org/drawingml/2006/table">
@@ -8503,7 +8190,7 @@
                       </a:pPr>
                       <a:r>
                         <a:rPr lang="en-US" sz="1600" dirty="0"/>
-                        <a:t>Slight inclination to higher resting BP for disease patients</a:t>
+                        <a:t>Slightly higher resting BP for disease patients</a:t>
                       </a:r>
                     </a:p>
                     <a:p>
@@ -8543,7 +8230,7 @@
                       </a:pPr>
                       <a:r>
                         <a:rPr lang="en-US" sz="1800" b="1" dirty="0"/>
-                        <a:t>Sex</a:t>
+                        <a:t>Gender </a:t>
                       </a:r>
                     </a:p>
                     <a:p>
@@ -8638,7 +8325,189 @@
 </p:sld>
 </file>
 
-<file path=ppt/slides/slide21.xml><?xml version="1.0" encoding="utf-8"?>
+<file path=ppt/slides/slide2.xml><?xml version="1.0" encoding="utf-8"?>
+<p:sld xmlns:a="http://schemas.openxmlformats.org/drawingml/2006/main" xmlns:r="http://schemas.openxmlformats.org/officeDocument/2006/relationships" xmlns:p="http://schemas.openxmlformats.org/presentationml/2006/main">
+  <p:cSld>
+    <p:spTree>
+      <p:nvGrpSpPr>
+        <p:cNvPr id="1" name=""/>
+        <p:cNvGrpSpPr/>
+        <p:nvPr/>
+      </p:nvGrpSpPr>
+      <p:grpSpPr>
+        <a:xfrm>
+          <a:off x="0" y="0"/>
+          <a:ext cx="0" cy="0"/>
+          <a:chOff x="0" y="0"/>
+          <a:chExt cx="0" cy="0"/>
+        </a:xfrm>
+      </p:grpSpPr>
+      <p:sp>
+        <p:nvSpPr>
+          <p:cNvPr id="2" name="Title 1">
+            <a:extLst>
+              <a:ext uri="{FF2B5EF4-FFF2-40B4-BE49-F238E27FC236}">
+                <a16:creationId xmlns:a16="http://schemas.microsoft.com/office/drawing/2014/main" id="{440D8973-AE11-0D48-ABBE-0DA2F02F2D15}"/>
+              </a:ext>
+            </a:extLst>
+          </p:cNvPr>
+          <p:cNvSpPr>
+            <a:spLocks noGrp="1"/>
+          </p:cNvSpPr>
+          <p:nvPr>
+            <p:ph type="title"/>
+          </p:nvPr>
+        </p:nvSpPr>
+        <p:spPr/>
+        <p:txBody>
+          <a:bodyPr/>
+          <a:lstStyle/>
+          <a:p>
+            <a:r>
+              <a:rPr lang="en-US" dirty="0"/>
+              <a:t>Motivation</a:t>
+            </a:r>
+          </a:p>
+        </p:txBody>
+      </p:sp>
+      <p:sp>
+        <p:nvSpPr>
+          <p:cNvPr id="3" name="Content Placeholder 2">
+            <a:extLst>
+              <a:ext uri="{FF2B5EF4-FFF2-40B4-BE49-F238E27FC236}">
+                <a16:creationId xmlns:a16="http://schemas.microsoft.com/office/drawing/2014/main" id="{84D4223E-4745-8748-8813-8294A7927AF9}"/>
+              </a:ext>
+            </a:extLst>
+          </p:cNvPr>
+          <p:cNvSpPr>
+            <a:spLocks noGrp="1"/>
+          </p:cNvSpPr>
+          <p:nvPr>
+            <p:ph idx="1"/>
+          </p:nvPr>
+        </p:nvSpPr>
+        <p:spPr/>
+        <p:txBody>
+          <a:bodyPr>
+            <a:normAutofit/>
+          </a:bodyPr>
+          <a:lstStyle/>
+          <a:p>
+            <a:r>
+              <a:rPr lang="en-US" dirty="0"/>
+              <a:t>The Lipid Heart Hypothesis (1950s)</a:t>
+            </a:r>
+          </a:p>
+          <a:p>
+            <a:pPr lvl="1"/>
+            <a:r>
+              <a:rPr lang="en-US" dirty="0"/>
+              <a:t>Cholesterol and Saturated Fat = </a:t>
+            </a:r>
+            <a:r>
+              <a:rPr lang="en-US" dirty="0">
+                <a:solidFill>
+                  <a:srgbClr val="FF0000"/>
+                </a:solidFill>
+              </a:rPr>
+              <a:t>Heart Disease</a:t>
+            </a:r>
+            <a:endParaRPr lang="en-US" dirty="0"/>
+          </a:p>
+          <a:p>
+            <a:pPr lvl="1"/>
+            <a:r>
+              <a:rPr lang="en-US" dirty="0"/>
+              <a:t>Recent studies point to </a:t>
+            </a:r>
+            <a:r>
+              <a:rPr lang="en-US" dirty="0">
+                <a:solidFill>
+                  <a:srgbClr val="FF0000"/>
+                </a:solidFill>
+              </a:rPr>
+              <a:t>sugar and processed carbs</a:t>
+            </a:r>
+          </a:p>
+          <a:p>
+            <a:r>
+              <a:rPr lang="en-US" dirty="0"/>
+              <a:t>What is the relationship between the </a:t>
+            </a:r>
+            <a:r>
+              <a:rPr lang="en-US" u="sng" dirty="0"/>
+              <a:t>presence of heart disease</a:t>
+            </a:r>
+            <a:r>
+              <a:rPr lang="en-US" dirty="0"/>
+              <a:t> and:</a:t>
+            </a:r>
+          </a:p>
+          <a:p>
+            <a:pPr lvl="1"/>
+            <a:r>
+              <a:rPr lang="en-US" dirty="0"/>
+              <a:t>Cholesterol?</a:t>
+            </a:r>
+          </a:p>
+          <a:p>
+            <a:pPr lvl="1"/>
+            <a:r>
+              <a:rPr lang="en-US" dirty="0"/>
+              <a:t>Fasting Blood Sugar?</a:t>
+            </a:r>
+          </a:p>
+          <a:p>
+            <a:pPr lvl="1"/>
+            <a:r>
+              <a:rPr lang="en-US" dirty="0"/>
+              <a:t>Resting Blood Pressure?</a:t>
+            </a:r>
+          </a:p>
+          <a:p>
+            <a:pPr lvl="1"/>
+            <a:r>
+              <a:rPr lang="en-US" dirty="0"/>
+              <a:t>Age? Sex?</a:t>
+            </a:r>
+          </a:p>
+          <a:p>
+            <a:pPr lvl="1"/>
+            <a:r>
+              <a:rPr lang="en-US" dirty="0"/>
+              <a:t>Type of Chest Pain?</a:t>
+            </a:r>
+          </a:p>
+          <a:p>
+            <a:pPr lvl="1"/>
+            <a:r>
+              <a:rPr lang="en-US" dirty="0"/>
+              <a:t>Maximum Heart Rate?</a:t>
+            </a:r>
+          </a:p>
+          <a:p>
+            <a:pPr lvl="1"/>
+            <a:endParaRPr lang="en-US" dirty="0"/>
+          </a:p>
+          <a:p>
+            <a:endParaRPr lang="en-US" dirty="0"/>
+          </a:p>
+        </p:txBody>
+      </p:sp>
+    </p:spTree>
+    <p:extLst>
+      <p:ext uri="{BB962C8B-B14F-4D97-AF65-F5344CB8AC3E}">
+        <p14:creationId xmlns:p14="http://schemas.microsoft.com/office/powerpoint/2010/main" val="650287038"/>
+      </p:ext>
+    </p:extLst>
+  </p:cSld>
+  <p:clrMapOvr>
+    <a:masterClrMapping/>
+  </p:clrMapOvr>
+</p:sld>
+</file>
+
+<file path=ppt/slides/slide20.xml><?xml version="1.0" encoding="utf-8"?>
 <p:sld xmlns:a="http://schemas.openxmlformats.org/drawingml/2006/main" xmlns:r="http://schemas.openxmlformats.org/officeDocument/2006/relationships" xmlns:p="http://schemas.openxmlformats.org/presentationml/2006/main">
   <p:cSld>
     <p:spTree>
@@ -10310,7 +10179,7 @@
         <p:spPr/>
         <p:txBody>
           <a:bodyPr>
-            <a:normAutofit lnSpcReduction="10000"/>
+            <a:normAutofit fontScale="92500" lnSpcReduction="10000"/>
           </a:bodyPr>
           <a:lstStyle/>
           <a:p>
@@ -10355,6 +10224,42 @@
           <a:p>
             <a:r>
               <a:rPr lang="en-US" sz="2000" b="1" dirty="0"/>
+              <a:t>Problems and Resolutions</a:t>
+            </a:r>
+          </a:p>
+          <a:p>
+            <a:pPr lvl="1"/>
+            <a:r>
+              <a:rPr lang="en-US" dirty="0"/>
+              <a:t>Dirty Data</a:t>
+            </a:r>
+          </a:p>
+          <a:p>
+            <a:pPr lvl="2"/>
+            <a:r>
+              <a:rPr lang="en-US" dirty="0" err="1"/>
+              <a:t>NaNs</a:t>
+            </a:r>
+            <a:endParaRPr lang="en-US" dirty="0"/>
+          </a:p>
+          <a:p>
+            <a:pPr lvl="2"/>
+            <a:r>
+              <a:rPr lang="en-US" dirty="0"/>
+              <a:t>Number Mismatches</a:t>
+            </a:r>
+          </a:p>
+          <a:p>
+            <a:pPr lvl="2"/>
+            <a:r>
+              <a:rPr lang="en-US" dirty="0"/>
+              <a:t>Unclear Column Names</a:t>
+            </a:r>
+            <a:endParaRPr lang="en-US" sz="2000" b="1" dirty="0"/>
+          </a:p>
+          <a:p>
+            <a:r>
+              <a:rPr lang="en-US" sz="2000" b="1" dirty="0"/>
               <a:t>New Insights</a:t>
             </a:r>
           </a:p>
@@ -10364,42 +10269,6 @@
               <a:rPr lang="en-US" dirty="0"/>
               <a:t>Predispositions to heart disease based on various factors</a:t>
             </a:r>
-          </a:p>
-          <a:p>
-            <a:r>
-              <a:rPr lang="en-US" sz="2000" b="1" dirty="0"/>
-              <a:t>Problems and Resolutions</a:t>
-            </a:r>
-          </a:p>
-          <a:p>
-            <a:pPr lvl="1"/>
-            <a:r>
-              <a:rPr lang="en-US" dirty="0"/>
-              <a:t>Dirty Data</a:t>
-            </a:r>
-          </a:p>
-          <a:p>
-            <a:pPr lvl="2"/>
-            <a:r>
-              <a:rPr lang="en-US" dirty="0" err="1"/>
-              <a:t>NaNs</a:t>
-            </a:r>
-            <a:endParaRPr lang="en-US" dirty="0"/>
-          </a:p>
-          <a:p>
-            <a:pPr lvl="2"/>
-            <a:r>
-              <a:rPr lang="en-US" dirty="0"/>
-              <a:t>Number Mismatches</a:t>
-            </a:r>
-          </a:p>
-          <a:p>
-            <a:pPr lvl="2"/>
-            <a:r>
-              <a:rPr lang="en-US" dirty="0"/>
-              <a:t>Unclear Column Names</a:t>
-            </a:r>
-            <a:endParaRPr lang="en-US" sz="2000" dirty="0"/>
           </a:p>
         </p:txBody>
       </p:sp>

</xml_diff>